<commit_message>
add rate,rating,fupload & upload templates
</commit_message>
<xml_diff>
--- a/media/resumes/doc/training_on_tablue.pptx
+++ b/media/resumes/doc/training_on_tablue.pptx
@@ -113,7 +113,7 @@
   </p:defaultTextStyle>
   <p:extLst>
     <p:ext uri="{EFAFB233-063F-42B5-8137-9DF3F51BA10A}">
-      <p15:sldGuideLst xmlns:p15="http://schemas.microsoft.com/office/powerpoint/2012/main"/>
+      <p15:sldGuideLst xmlns="" xmlns:p15="http://schemas.microsoft.com/office/powerpoint/2012/main"/>
     </p:ext>
   </p:extLst>
 </p:presentation>
@@ -141,7 +141,7 @@
           <p:cNvPr id="2" name="Title 1">
             <a:extLst>
               <a:ext uri="{FF2B5EF4-FFF2-40B4-BE49-F238E27FC236}">
-                <a16:creationId xmlns:a16="http://schemas.microsoft.com/office/drawing/2014/main" id="{FC4170D0-CAAC-4B92-804B-BE564BEE7748}"/>
+                <a16:creationId xmlns="" xmlns:a16="http://schemas.microsoft.com/office/drawing/2014/main" id="{FC4170D0-CAAC-4B92-804B-BE564BEE7748}"/>
               </a:ext>
             </a:extLst>
           </p:cNvPr>
@@ -178,7 +178,7 @@
           <p:cNvPr id="3" name="Subtitle 2">
             <a:extLst>
               <a:ext uri="{FF2B5EF4-FFF2-40B4-BE49-F238E27FC236}">
-                <a16:creationId xmlns:a16="http://schemas.microsoft.com/office/drawing/2014/main" id="{54AC2ACD-82C6-46DF-A4FE-97C02F9BBF4F}"/>
+                <a16:creationId xmlns="" xmlns:a16="http://schemas.microsoft.com/office/drawing/2014/main" id="{54AC2ACD-82C6-46DF-A4FE-97C02F9BBF4F}"/>
               </a:ext>
             </a:extLst>
           </p:cNvPr>
@@ -248,7 +248,7 @@
           <p:cNvPr id="4" name="Date Placeholder 3">
             <a:extLst>
               <a:ext uri="{FF2B5EF4-FFF2-40B4-BE49-F238E27FC236}">
-                <a16:creationId xmlns:a16="http://schemas.microsoft.com/office/drawing/2014/main" id="{E191012C-B0AE-4CC8-90EE-40F0433147F9}"/>
+                <a16:creationId xmlns="" xmlns:a16="http://schemas.microsoft.com/office/drawing/2014/main" id="{E191012C-B0AE-4CC8-90EE-40F0433147F9}"/>
               </a:ext>
             </a:extLst>
           </p:cNvPr>
@@ -266,7 +266,7 @@
           <a:p>
             <a:fld id="{D395B063-14E2-4061-81F5-618BC32A213E}" type="datetimeFigureOut">
               <a:rPr lang="en-US" smtClean="0"/>
-              <a:t>9/20/2020</a:t>
+              <a:t>10/28/2020</a:t>
             </a:fld>
             <a:endParaRPr lang="en-US" dirty="0"/>
           </a:p>
@@ -277,7 +277,7 @@
           <p:cNvPr id="5" name="Footer Placeholder 4">
             <a:extLst>
               <a:ext uri="{FF2B5EF4-FFF2-40B4-BE49-F238E27FC236}">
-                <a16:creationId xmlns:a16="http://schemas.microsoft.com/office/drawing/2014/main" id="{9AFF6EE3-109A-4F46-9DBF-C3E77EB34D2A}"/>
+                <a16:creationId xmlns="" xmlns:a16="http://schemas.microsoft.com/office/drawing/2014/main" id="{9AFF6EE3-109A-4F46-9DBF-C3E77EB34D2A}"/>
               </a:ext>
             </a:extLst>
           </p:cNvPr>
@@ -302,7 +302,7 @@
           <p:cNvPr id="6" name="Slide Number Placeholder 5">
             <a:extLst>
               <a:ext uri="{FF2B5EF4-FFF2-40B4-BE49-F238E27FC236}">
-                <a16:creationId xmlns:a16="http://schemas.microsoft.com/office/drawing/2014/main" id="{D1CCC04C-68C5-4138-A3AF-8BE6F527B48F}"/>
+                <a16:creationId xmlns="" xmlns:a16="http://schemas.microsoft.com/office/drawing/2014/main" id="{D1CCC04C-68C5-4138-A3AF-8BE6F527B48F}"/>
               </a:ext>
             </a:extLst>
           </p:cNvPr>
@@ -361,7 +361,7 @@
           <p:cNvPr id="2" name="Title 1">
             <a:extLst>
               <a:ext uri="{FF2B5EF4-FFF2-40B4-BE49-F238E27FC236}">
-                <a16:creationId xmlns:a16="http://schemas.microsoft.com/office/drawing/2014/main" id="{05533BCE-BCE9-4449-8EF8-14C933240A83}"/>
+                <a16:creationId xmlns="" xmlns:a16="http://schemas.microsoft.com/office/drawing/2014/main" id="{05533BCE-BCE9-4449-8EF8-14C933240A83}"/>
               </a:ext>
             </a:extLst>
           </p:cNvPr>
@@ -389,7 +389,7 @@
           <p:cNvPr id="3" name="Vertical Text Placeholder 2">
             <a:extLst>
               <a:ext uri="{FF2B5EF4-FFF2-40B4-BE49-F238E27FC236}">
-                <a16:creationId xmlns:a16="http://schemas.microsoft.com/office/drawing/2014/main" id="{0A499187-66A4-40DE-97E6-6F7802FE56D2}"/>
+                <a16:creationId xmlns="" xmlns:a16="http://schemas.microsoft.com/office/drawing/2014/main" id="{0A499187-66A4-40DE-97E6-6F7802FE56D2}"/>
               </a:ext>
             </a:extLst>
           </p:cNvPr>
@@ -446,7 +446,7 @@
           <p:cNvPr id="4" name="Date Placeholder 3">
             <a:extLst>
               <a:ext uri="{FF2B5EF4-FFF2-40B4-BE49-F238E27FC236}">
-                <a16:creationId xmlns:a16="http://schemas.microsoft.com/office/drawing/2014/main" id="{A62FD84A-6BDE-48F3-BAA6-EBE10BFB115E}"/>
+                <a16:creationId xmlns="" xmlns:a16="http://schemas.microsoft.com/office/drawing/2014/main" id="{A62FD84A-6BDE-48F3-BAA6-EBE10BFB115E}"/>
               </a:ext>
             </a:extLst>
           </p:cNvPr>
@@ -464,7 +464,7 @@
           <a:p>
             <a:fld id="{D395B063-14E2-4061-81F5-618BC32A213E}" type="datetimeFigureOut">
               <a:rPr lang="en-US" smtClean="0"/>
-              <a:t>9/20/2020</a:t>
+              <a:t>10/28/2020</a:t>
             </a:fld>
             <a:endParaRPr lang="en-US" dirty="0"/>
           </a:p>
@@ -475,7 +475,7 @@
           <p:cNvPr id="5" name="Footer Placeholder 4">
             <a:extLst>
               <a:ext uri="{FF2B5EF4-FFF2-40B4-BE49-F238E27FC236}">
-                <a16:creationId xmlns:a16="http://schemas.microsoft.com/office/drawing/2014/main" id="{A1E75DE8-72E8-4B14-A0BD-6A44BCC3C03E}"/>
+                <a16:creationId xmlns="" xmlns:a16="http://schemas.microsoft.com/office/drawing/2014/main" id="{A1E75DE8-72E8-4B14-A0BD-6A44BCC3C03E}"/>
               </a:ext>
             </a:extLst>
           </p:cNvPr>
@@ -500,7 +500,7 @@
           <p:cNvPr id="6" name="Slide Number Placeholder 5">
             <a:extLst>
               <a:ext uri="{FF2B5EF4-FFF2-40B4-BE49-F238E27FC236}">
-                <a16:creationId xmlns:a16="http://schemas.microsoft.com/office/drawing/2014/main" id="{984AE634-E144-46DA-A481-788C7F2A3D8C}"/>
+                <a16:creationId xmlns="" xmlns:a16="http://schemas.microsoft.com/office/drawing/2014/main" id="{984AE634-E144-46DA-A481-788C7F2A3D8C}"/>
               </a:ext>
             </a:extLst>
           </p:cNvPr>
@@ -559,7 +559,7 @@
           <p:cNvPr id="2" name="Vertical Title 1">
             <a:extLst>
               <a:ext uri="{FF2B5EF4-FFF2-40B4-BE49-F238E27FC236}">
-                <a16:creationId xmlns:a16="http://schemas.microsoft.com/office/drawing/2014/main" id="{CB26F177-9A82-45AE-9E43-D32D4B8BC8D6}"/>
+                <a16:creationId xmlns="" xmlns:a16="http://schemas.microsoft.com/office/drawing/2014/main" id="{CB26F177-9A82-45AE-9E43-D32D4B8BC8D6}"/>
               </a:ext>
             </a:extLst>
           </p:cNvPr>
@@ -592,7 +592,7 @@
           <p:cNvPr id="3" name="Vertical Text Placeholder 2">
             <a:extLst>
               <a:ext uri="{FF2B5EF4-FFF2-40B4-BE49-F238E27FC236}">
-                <a16:creationId xmlns:a16="http://schemas.microsoft.com/office/drawing/2014/main" id="{822DC771-0938-4344-B720-3596E5794DC9}"/>
+                <a16:creationId xmlns="" xmlns:a16="http://schemas.microsoft.com/office/drawing/2014/main" id="{822DC771-0938-4344-B720-3596E5794DC9}"/>
               </a:ext>
             </a:extLst>
           </p:cNvPr>
@@ -654,7 +654,7 @@
           <p:cNvPr id="4" name="Date Placeholder 3">
             <a:extLst>
               <a:ext uri="{FF2B5EF4-FFF2-40B4-BE49-F238E27FC236}">
-                <a16:creationId xmlns:a16="http://schemas.microsoft.com/office/drawing/2014/main" id="{8D749CFB-05F9-4495-874B-A924C8976AEF}"/>
+                <a16:creationId xmlns="" xmlns:a16="http://schemas.microsoft.com/office/drawing/2014/main" id="{8D749CFB-05F9-4495-874B-A924C8976AEF}"/>
               </a:ext>
             </a:extLst>
           </p:cNvPr>
@@ -672,7 +672,7 @@
           <a:p>
             <a:fld id="{D395B063-14E2-4061-81F5-618BC32A213E}" type="datetimeFigureOut">
               <a:rPr lang="en-US" smtClean="0"/>
-              <a:t>9/20/2020</a:t>
+              <a:t>10/28/2020</a:t>
             </a:fld>
             <a:endParaRPr lang="en-US" dirty="0"/>
           </a:p>
@@ -683,7 +683,7 @@
           <p:cNvPr id="5" name="Footer Placeholder 4">
             <a:extLst>
               <a:ext uri="{FF2B5EF4-FFF2-40B4-BE49-F238E27FC236}">
-                <a16:creationId xmlns:a16="http://schemas.microsoft.com/office/drawing/2014/main" id="{A50E51FB-8290-4A61-93F3-025AE75C7B91}"/>
+                <a16:creationId xmlns="" xmlns:a16="http://schemas.microsoft.com/office/drawing/2014/main" id="{A50E51FB-8290-4A61-93F3-025AE75C7B91}"/>
               </a:ext>
             </a:extLst>
           </p:cNvPr>
@@ -708,7 +708,7 @@
           <p:cNvPr id="6" name="Slide Number Placeholder 5">
             <a:extLst>
               <a:ext uri="{FF2B5EF4-FFF2-40B4-BE49-F238E27FC236}">
-                <a16:creationId xmlns:a16="http://schemas.microsoft.com/office/drawing/2014/main" id="{5AE0AE1A-B0CA-4F3D-BCE6-5BACE9580077}"/>
+                <a16:creationId xmlns="" xmlns:a16="http://schemas.microsoft.com/office/drawing/2014/main" id="{5AE0AE1A-B0CA-4F3D-BCE6-5BACE9580077}"/>
               </a:ext>
             </a:extLst>
           </p:cNvPr>
@@ -767,7 +767,7 @@
           <p:cNvPr id="2" name="Title 1">
             <a:extLst>
               <a:ext uri="{FF2B5EF4-FFF2-40B4-BE49-F238E27FC236}">
-                <a16:creationId xmlns:a16="http://schemas.microsoft.com/office/drawing/2014/main" id="{E2D03BDD-DFED-4C99-952E-A6436CEDF709}"/>
+                <a16:creationId xmlns="" xmlns:a16="http://schemas.microsoft.com/office/drawing/2014/main" id="{E2D03BDD-DFED-4C99-952E-A6436CEDF709}"/>
               </a:ext>
             </a:extLst>
           </p:cNvPr>
@@ -795,7 +795,7 @@
           <p:cNvPr id="3" name="Content Placeholder 2">
             <a:extLst>
               <a:ext uri="{FF2B5EF4-FFF2-40B4-BE49-F238E27FC236}">
-                <a16:creationId xmlns:a16="http://schemas.microsoft.com/office/drawing/2014/main" id="{B3103579-B644-4C14-9962-B5EA6B55EF8C}"/>
+                <a16:creationId xmlns="" xmlns:a16="http://schemas.microsoft.com/office/drawing/2014/main" id="{B3103579-B644-4C14-9962-B5EA6B55EF8C}"/>
               </a:ext>
             </a:extLst>
           </p:cNvPr>
@@ -852,7 +852,7 @@
           <p:cNvPr id="4" name="Date Placeholder 3">
             <a:extLst>
               <a:ext uri="{FF2B5EF4-FFF2-40B4-BE49-F238E27FC236}">
-                <a16:creationId xmlns:a16="http://schemas.microsoft.com/office/drawing/2014/main" id="{6EE6A351-E439-470D-BB52-D8B4F2FBDF9D}"/>
+                <a16:creationId xmlns="" xmlns:a16="http://schemas.microsoft.com/office/drawing/2014/main" id="{6EE6A351-E439-470D-BB52-D8B4F2FBDF9D}"/>
               </a:ext>
             </a:extLst>
           </p:cNvPr>
@@ -870,7 +870,7 @@
           <a:p>
             <a:fld id="{D395B063-14E2-4061-81F5-618BC32A213E}" type="datetimeFigureOut">
               <a:rPr lang="en-US" smtClean="0"/>
-              <a:t>9/20/2020</a:t>
+              <a:t>10/28/2020</a:t>
             </a:fld>
             <a:endParaRPr lang="en-US" dirty="0"/>
           </a:p>
@@ -881,7 +881,7 @@
           <p:cNvPr id="5" name="Footer Placeholder 4">
             <a:extLst>
               <a:ext uri="{FF2B5EF4-FFF2-40B4-BE49-F238E27FC236}">
-                <a16:creationId xmlns:a16="http://schemas.microsoft.com/office/drawing/2014/main" id="{5AE91B57-4DCB-4431-A4F8-12B2AA32C255}"/>
+                <a16:creationId xmlns="" xmlns:a16="http://schemas.microsoft.com/office/drawing/2014/main" id="{5AE91B57-4DCB-4431-A4F8-12B2AA32C255}"/>
               </a:ext>
             </a:extLst>
           </p:cNvPr>
@@ -906,7 +906,7 @@
           <p:cNvPr id="6" name="Slide Number Placeholder 5">
             <a:extLst>
               <a:ext uri="{FF2B5EF4-FFF2-40B4-BE49-F238E27FC236}">
-                <a16:creationId xmlns:a16="http://schemas.microsoft.com/office/drawing/2014/main" id="{111140F2-BAC1-4412-8849-31A0A75F9D33}"/>
+                <a16:creationId xmlns="" xmlns:a16="http://schemas.microsoft.com/office/drawing/2014/main" id="{111140F2-BAC1-4412-8849-31A0A75F9D33}"/>
               </a:ext>
             </a:extLst>
           </p:cNvPr>
@@ -965,7 +965,7 @@
           <p:cNvPr id="2" name="Title 1">
             <a:extLst>
               <a:ext uri="{FF2B5EF4-FFF2-40B4-BE49-F238E27FC236}">
-                <a16:creationId xmlns:a16="http://schemas.microsoft.com/office/drawing/2014/main" id="{33044727-1D5F-4C43-B1B8-FEF6D6477DDF}"/>
+                <a16:creationId xmlns="" xmlns:a16="http://schemas.microsoft.com/office/drawing/2014/main" id="{33044727-1D5F-4C43-B1B8-FEF6D6477DDF}"/>
               </a:ext>
             </a:extLst>
           </p:cNvPr>
@@ -1002,7 +1002,7 @@
           <p:cNvPr id="3" name="Text Placeholder 2">
             <a:extLst>
               <a:ext uri="{FF2B5EF4-FFF2-40B4-BE49-F238E27FC236}">
-                <a16:creationId xmlns:a16="http://schemas.microsoft.com/office/drawing/2014/main" id="{2EAFD946-4C84-4488-AA91-990F329597B6}"/>
+                <a16:creationId xmlns="" xmlns:a16="http://schemas.microsoft.com/office/drawing/2014/main" id="{2EAFD946-4C84-4488-AA91-990F329597B6}"/>
               </a:ext>
             </a:extLst>
           </p:cNvPr>
@@ -1127,7 +1127,7 @@
           <p:cNvPr id="4" name="Date Placeholder 3">
             <a:extLst>
               <a:ext uri="{FF2B5EF4-FFF2-40B4-BE49-F238E27FC236}">
-                <a16:creationId xmlns:a16="http://schemas.microsoft.com/office/drawing/2014/main" id="{21BBD843-56E9-4721-8C72-7CD5A8E49234}"/>
+                <a16:creationId xmlns="" xmlns:a16="http://schemas.microsoft.com/office/drawing/2014/main" id="{21BBD843-56E9-4721-8C72-7CD5A8E49234}"/>
               </a:ext>
             </a:extLst>
           </p:cNvPr>
@@ -1145,7 +1145,7 @@
           <a:p>
             <a:fld id="{D395B063-14E2-4061-81F5-618BC32A213E}" type="datetimeFigureOut">
               <a:rPr lang="en-US" smtClean="0"/>
-              <a:t>9/20/2020</a:t>
+              <a:t>10/28/2020</a:t>
             </a:fld>
             <a:endParaRPr lang="en-US" dirty="0"/>
           </a:p>
@@ -1156,7 +1156,7 @@
           <p:cNvPr id="5" name="Footer Placeholder 4">
             <a:extLst>
               <a:ext uri="{FF2B5EF4-FFF2-40B4-BE49-F238E27FC236}">
-                <a16:creationId xmlns:a16="http://schemas.microsoft.com/office/drawing/2014/main" id="{FE8F4FB1-71E2-4615-A821-B575A7D2F4EE}"/>
+                <a16:creationId xmlns="" xmlns:a16="http://schemas.microsoft.com/office/drawing/2014/main" id="{FE8F4FB1-71E2-4615-A821-B575A7D2F4EE}"/>
               </a:ext>
             </a:extLst>
           </p:cNvPr>
@@ -1181,7 +1181,7 @@
           <p:cNvPr id="6" name="Slide Number Placeholder 5">
             <a:extLst>
               <a:ext uri="{FF2B5EF4-FFF2-40B4-BE49-F238E27FC236}">
-                <a16:creationId xmlns:a16="http://schemas.microsoft.com/office/drawing/2014/main" id="{64D01965-D2F6-49C3-A238-180AB533BF6A}"/>
+                <a16:creationId xmlns="" xmlns:a16="http://schemas.microsoft.com/office/drawing/2014/main" id="{64D01965-D2F6-49C3-A238-180AB533BF6A}"/>
               </a:ext>
             </a:extLst>
           </p:cNvPr>
@@ -1240,7 +1240,7 @@
           <p:cNvPr id="2" name="Title 1">
             <a:extLst>
               <a:ext uri="{FF2B5EF4-FFF2-40B4-BE49-F238E27FC236}">
-                <a16:creationId xmlns:a16="http://schemas.microsoft.com/office/drawing/2014/main" id="{2D7F1EA6-47A5-4BCE-BEA0-8C15E6153819}"/>
+                <a16:creationId xmlns="" xmlns:a16="http://schemas.microsoft.com/office/drawing/2014/main" id="{2D7F1EA6-47A5-4BCE-BEA0-8C15E6153819}"/>
               </a:ext>
             </a:extLst>
           </p:cNvPr>
@@ -1268,7 +1268,7 @@
           <p:cNvPr id="3" name="Content Placeholder 2">
             <a:extLst>
               <a:ext uri="{FF2B5EF4-FFF2-40B4-BE49-F238E27FC236}">
-                <a16:creationId xmlns:a16="http://schemas.microsoft.com/office/drawing/2014/main" id="{396DA80E-1AF3-47A1-B4D7-07BB13B64D55}"/>
+                <a16:creationId xmlns="" xmlns:a16="http://schemas.microsoft.com/office/drawing/2014/main" id="{396DA80E-1AF3-47A1-B4D7-07BB13B64D55}"/>
               </a:ext>
             </a:extLst>
           </p:cNvPr>
@@ -1330,7 +1330,7 @@
           <p:cNvPr id="4" name="Content Placeholder 3">
             <a:extLst>
               <a:ext uri="{FF2B5EF4-FFF2-40B4-BE49-F238E27FC236}">
-                <a16:creationId xmlns:a16="http://schemas.microsoft.com/office/drawing/2014/main" id="{66DF717C-4B65-4C40-BBFA-E38546843F1A}"/>
+                <a16:creationId xmlns="" xmlns:a16="http://schemas.microsoft.com/office/drawing/2014/main" id="{66DF717C-4B65-4C40-BBFA-E38546843F1A}"/>
               </a:ext>
             </a:extLst>
           </p:cNvPr>
@@ -1392,7 +1392,7 @@
           <p:cNvPr id="5" name="Date Placeholder 4">
             <a:extLst>
               <a:ext uri="{FF2B5EF4-FFF2-40B4-BE49-F238E27FC236}">
-                <a16:creationId xmlns:a16="http://schemas.microsoft.com/office/drawing/2014/main" id="{54E77FE9-9EB5-49D9-AD44-580B6EB88734}"/>
+                <a16:creationId xmlns="" xmlns:a16="http://schemas.microsoft.com/office/drawing/2014/main" id="{54E77FE9-9EB5-49D9-AD44-580B6EB88734}"/>
               </a:ext>
             </a:extLst>
           </p:cNvPr>
@@ -1410,7 +1410,7 @@
           <a:p>
             <a:fld id="{D395B063-14E2-4061-81F5-618BC32A213E}" type="datetimeFigureOut">
               <a:rPr lang="en-US" smtClean="0"/>
-              <a:t>9/20/2020</a:t>
+              <a:t>10/28/2020</a:t>
             </a:fld>
             <a:endParaRPr lang="en-US" dirty="0"/>
           </a:p>
@@ -1421,7 +1421,7 @@
           <p:cNvPr id="6" name="Footer Placeholder 5">
             <a:extLst>
               <a:ext uri="{FF2B5EF4-FFF2-40B4-BE49-F238E27FC236}">
-                <a16:creationId xmlns:a16="http://schemas.microsoft.com/office/drawing/2014/main" id="{8CFF3340-B374-4A1D-A423-292CC3589EF5}"/>
+                <a16:creationId xmlns="" xmlns:a16="http://schemas.microsoft.com/office/drawing/2014/main" id="{8CFF3340-B374-4A1D-A423-292CC3589EF5}"/>
               </a:ext>
             </a:extLst>
           </p:cNvPr>
@@ -1446,7 +1446,7 @@
           <p:cNvPr id="7" name="Slide Number Placeholder 6">
             <a:extLst>
               <a:ext uri="{FF2B5EF4-FFF2-40B4-BE49-F238E27FC236}">
-                <a16:creationId xmlns:a16="http://schemas.microsoft.com/office/drawing/2014/main" id="{AC02B44E-A15C-4E57-82E5-0AB3F2A8C1E2}"/>
+                <a16:creationId xmlns="" xmlns:a16="http://schemas.microsoft.com/office/drawing/2014/main" id="{AC02B44E-A15C-4E57-82E5-0AB3F2A8C1E2}"/>
               </a:ext>
             </a:extLst>
           </p:cNvPr>
@@ -1505,7 +1505,7 @@
           <p:cNvPr id="2" name="Title 1">
             <a:extLst>
               <a:ext uri="{FF2B5EF4-FFF2-40B4-BE49-F238E27FC236}">
-                <a16:creationId xmlns:a16="http://schemas.microsoft.com/office/drawing/2014/main" id="{002FF43F-AE97-4EC6-990B-A77A4C68C220}"/>
+                <a16:creationId xmlns="" xmlns:a16="http://schemas.microsoft.com/office/drawing/2014/main" id="{002FF43F-AE97-4EC6-990B-A77A4C68C220}"/>
               </a:ext>
             </a:extLst>
           </p:cNvPr>
@@ -1538,7 +1538,7 @@
           <p:cNvPr id="3" name="Text Placeholder 2">
             <a:extLst>
               <a:ext uri="{FF2B5EF4-FFF2-40B4-BE49-F238E27FC236}">
-                <a16:creationId xmlns:a16="http://schemas.microsoft.com/office/drawing/2014/main" id="{4F4BDB11-49B3-41AF-8E2A-8D96C675F3DB}"/>
+                <a16:creationId xmlns="" xmlns:a16="http://schemas.microsoft.com/office/drawing/2014/main" id="{4F4BDB11-49B3-41AF-8E2A-8D96C675F3DB}"/>
               </a:ext>
             </a:extLst>
           </p:cNvPr>
@@ -1609,7 +1609,7 @@
           <p:cNvPr id="4" name="Content Placeholder 3">
             <a:extLst>
               <a:ext uri="{FF2B5EF4-FFF2-40B4-BE49-F238E27FC236}">
-                <a16:creationId xmlns:a16="http://schemas.microsoft.com/office/drawing/2014/main" id="{D91E6C1E-CDF1-4F9B-844E-BBB89DF8D81F}"/>
+                <a16:creationId xmlns="" xmlns:a16="http://schemas.microsoft.com/office/drawing/2014/main" id="{D91E6C1E-CDF1-4F9B-844E-BBB89DF8D81F}"/>
               </a:ext>
             </a:extLst>
           </p:cNvPr>
@@ -1671,7 +1671,7 @@
           <p:cNvPr id="5" name="Text Placeholder 4">
             <a:extLst>
               <a:ext uri="{FF2B5EF4-FFF2-40B4-BE49-F238E27FC236}">
-                <a16:creationId xmlns:a16="http://schemas.microsoft.com/office/drawing/2014/main" id="{7749BA6E-9766-4078-8F78-BD8034D0BD14}"/>
+                <a16:creationId xmlns="" xmlns:a16="http://schemas.microsoft.com/office/drawing/2014/main" id="{7749BA6E-9766-4078-8F78-BD8034D0BD14}"/>
               </a:ext>
             </a:extLst>
           </p:cNvPr>
@@ -1742,7 +1742,7 @@
           <p:cNvPr id="6" name="Content Placeholder 5">
             <a:extLst>
               <a:ext uri="{FF2B5EF4-FFF2-40B4-BE49-F238E27FC236}">
-                <a16:creationId xmlns:a16="http://schemas.microsoft.com/office/drawing/2014/main" id="{AB084DE7-40A6-4431-80D0-91FA78993668}"/>
+                <a16:creationId xmlns="" xmlns:a16="http://schemas.microsoft.com/office/drawing/2014/main" id="{AB084DE7-40A6-4431-80D0-91FA78993668}"/>
               </a:ext>
             </a:extLst>
           </p:cNvPr>
@@ -1804,7 +1804,7 @@
           <p:cNvPr id="7" name="Date Placeholder 6">
             <a:extLst>
               <a:ext uri="{FF2B5EF4-FFF2-40B4-BE49-F238E27FC236}">
-                <a16:creationId xmlns:a16="http://schemas.microsoft.com/office/drawing/2014/main" id="{489D6CF5-82D9-4D06-8CAA-43EE65F0D2D2}"/>
+                <a16:creationId xmlns="" xmlns:a16="http://schemas.microsoft.com/office/drawing/2014/main" id="{489D6CF5-82D9-4D06-8CAA-43EE65F0D2D2}"/>
               </a:ext>
             </a:extLst>
           </p:cNvPr>
@@ -1822,7 +1822,7 @@
           <a:p>
             <a:fld id="{D395B063-14E2-4061-81F5-618BC32A213E}" type="datetimeFigureOut">
               <a:rPr lang="en-US" smtClean="0"/>
-              <a:t>9/20/2020</a:t>
+              <a:t>10/28/2020</a:t>
             </a:fld>
             <a:endParaRPr lang="en-US" dirty="0"/>
           </a:p>
@@ -1833,7 +1833,7 @@
           <p:cNvPr id="8" name="Footer Placeholder 7">
             <a:extLst>
               <a:ext uri="{FF2B5EF4-FFF2-40B4-BE49-F238E27FC236}">
-                <a16:creationId xmlns:a16="http://schemas.microsoft.com/office/drawing/2014/main" id="{A4AE8739-0351-484A-8E0A-575BFDD89CEB}"/>
+                <a16:creationId xmlns="" xmlns:a16="http://schemas.microsoft.com/office/drawing/2014/main" id="{A4AE8739-0351-484A-8E0A-575BFDD89CEB}"/>
               </a:ext>
             </a:extLst>
           </p:cNvPr>
@@ -1858,7 +1858,7 @@
           <p:cNvPr id="9" name="Slide Number Placeholder 8">
             <a:extLst>
               <a:ext uri="{FF2B5EF4-FFF2-40B4-BE49-F238E27FC236}">
-                <a16:creationId xmlns:a16="http://schemas.microsoft.com/office/drawing/2014/main" id="{4BEB10AC-CC21-459C-80B5-341B5A973870}"/>
+                <a16:creationId xmlns="" xmlns:a16="http://schemas.microsoft.com/office/drawing/2014/main" id="{4BEB10AC-CC21-459C-80B5-341B5A973870}"/>
               </a:ext>
             </a:extLst>
           </p:cNvPr>
@@ -1917,7 +1917,7 @@
           <p:cNvPr id="2" name="Title 1">
             <a:extLst>
               <a:ext uri="{FF2B5EF4-FFF2-40B4-BE49-F238E27FC236}">
-                <a16:creationId xmlns:a16="http://schemas.microsoft.com/office/drawing/2014/main" id="{83A5986C-380B-4823-8BC4-A1242DDD5978}"/>
+                <a16:creationId xmlns="" xmlns:a16="http://schemas.microsoft.com/office/drawing/2014/main" id="{83A5986C-380B-4823-8BC4-A1242DDD5978}"/>
               </a:ext>
             </a:extLst>
           </p:cNvPr>
@@ -1945,7 +1945,7 @@
           <p:cNvPr id="3" name="Date Placeholder 2">
             <a:extLst>
               <a:ext uri="{FF2B5EF4-FFF2-40B4-BE49-F238E27FC236}">
-                <a16:creationId xmlns:a16="http://schemas.microsoft.com/office/drawing/2014/main" id="{E38A34E3-00FC-4EF0-BC7F-1E4DF5DB6FCD}"/>
+                <a16:creationId xmlns="" xmlns:a16="http://schemas.microsoft.com/office/drawing/2014/main" id="{E38A34E3-00FC-4EF0-BC7F-1E4DF5DB6FCD}"/>
               </a:ext>
             </a:extLst>
           </p:cNvPr>
@@ -1963,7 +1963,7 @@
           <a:p>
             <a:fld id="{D395B063-14E2-4061-81F5-618BC32A213E}" type="datetimeFigureOut">
               <a:rPr lang="en-US" smtClean="0"/>
-              <a:t>9/20/2020</a:t>
+              <a:t>10/28/2020</a:t>
             </a:fld>
             <a:endParaRPr lang="en-US" dirty="0"/>
           </a:p>
@@ -1974,7 +1974,7 @@
           <p:cNvPr id="4" name="Footer Placeholder 3">
             <a:extLst>
               <a:ext uri="{FF2B5EF4-FFF2-40B4-BE49-F238E27FC236}">
-                <a16:creationId xmlns:a16="http://schemas.microsoft.com/office/drawing/2014/main" id="{E3CA393F-6103-42E6-94C5-BDA927C125B8}"/>
+                <a16:creationId xmlns="" xmlns:a16="http://schemas.microsoft.com/office/drawing/2014/main" id="{E3CA393F-6103-42E6-94C5-BDA927C125B8}"/>
               </a:ext>
             </a:extLst>
           </p:cNvPr>
@@ -1999,7 +1999,7 @@
           <p:cNvPr id="5" name="Slide Number Placeholder 4">
             <a:extLst>
               <a:ext uri="{FF2B5EF4-FFF2-40B4-BE49-F238E27FC236}">
-                <a16:creationId xmlns:a16="http://schemas.microsoft.com/office/drawing/2014/main" id="{DBC28217-1424-4F92-9B3F-B52F54DDB980}"/>
+                <a16:creationId xmlns="" xmlns:a16="http://schemas.microsoft.com/office/drawing/2014/main" id="{DBC28217-1424-4F92-9B3F-B52F54DDB980}"/>
               </a:ext>
             </a:extLst>
           </p:cNvPr>
@@ -2058,7 +2058,7 @@
           <p:cNvPr id="2" name="Date Placeholder 1">
             <a:extLst>
               <a:ext uri="{FF2B5EF4-FFF2-40B4-BE49-F238E27FC236}">
-                <a16:creationId xmlns:a16="http://schemas.microsoft.com/office/drawing/2014/main" id="{F7DC070A-18CF-461A-904F-02A57F039C81}"/>
+                <a16:creationId xmlns="" xmlns:a16="http://schemas.microsoft.com/office/drawing/2014/main" id="{F7DC070A-18CF-461A-904F-02A57F039C81}"/>
               </a:ext>
             </a:extLst>
           </p:cNvPr>
@@ -2076,7 +2076,7 @@
           <a:p>
             <a:fld id="{D395B063-14E2-4061-81F5-618BC32A213E}" type="datetimeFigureOut">
               <a:rPr lang="en-US" smtClean="0"/>
-              <a:t>9/20/2020</a:t>
+              <a:t>10/28/2020</a:t>
             </a:fld>
             <a:endParaRPr lang="en-US" dirty="0"/>
           </a:p>
@@ -2087,7 +2087,7 @@
           <p:cNvPr id="3" name="Footer Placeholder 2">
             <a:extLst>
               <a:ext uri="{FF2B5EF4-FFF2-40B4-BE49-F238E27FC236}">
-                <a16:creationId xmlns:a16="http://schemas.microsoft.com/office/drawing/2014/main" id="{89BA3256-439E-46F6-BE42-8D0C0D980CE6}"/>
+                <a16:creationId xmlns="" xmlns:a16="http://schemas.microsoft.com/office/drawing/2014/main" id="{89BA3256-439E-46F6-BE42-8D0C0D980CE6}"/>
               </a:ext>
             </a:extLst>
           </p:cNvPr>
@@ -2112,7 +2112,7 @@
           <p:cNvPr id="4" name="Slide Number Placeholder 3">
             <a:extLst>
               <a:ext uri="{FF2B5EF4-FFF2-40B4-BE49-F238E27FC236}">
-                <a16:creationId xmlns:a16="http://schemas.microsoft.com/office/drawing/2014/main" id="{364BDBEA-366D-4279-BC68-64DE0ECAD46F}"/>
+                <a16:creationId xmlns="" xmlns:a16="http://schemas.microsoft.com/office/drawing/2014/main" id="{364BDBEA-366D-4279-BC68-64DE0ECAD46F}"/>
               </a:ext>
             </a:extLst>
           </p:cNvPr>
@@ -2171,7 +2171,7 @@
           <p:cNvPr id="2" name="Title 1">
             <a:extLst>
               <a:ext uri="{FF2B5EF4-FFF2-40B4-BE49-F238E27FC236}">
-                <a16:creationId xmlns:a16="http://schemas.microsoft.com/office/drawing/2014/main" id="{0CB71327-DB73-4769-82E7-23252C99E836}"/>
+                <a16:creationId xmlns="" xmlns:a16="http://schemas.microsoft.com/office/drawing/2014/main" id="{0CB71327-DB73-4769-82E7-23252C99E836}"/>
               </a:ext>
             </a:extLst>
           </p:cNvPr>
@@ -2208,7 +2208,7 @@
           <p:cNvPr id="3" name="Content Placeholder 2">
             <a:extLst>
               <a:ext uri="{FF2B5EF4-FFF2-40B4-BE49-F238E27FC236}">
-                <a16:creationId xmlns:a16="http://schemas.microsoft.com/office/drawing/2014/main" id="{58781B7C-8A38-43F8-8F36-EF86D5DC6780}"/>
+                <a16:creationId xmlns="" xmlns:a16="http://schemas.microsoft.com/office/drawing/2014/main" id="{58781B7C-8A38-43F8-8F36-EF86D5DC6780}"/>
               </a:ext>
             </a:extLst>
           </p:cNvPr>
@@ -2298,7 +2298,7 @@
           <p:cNvPr id="4" name="Text Placeholder 3">
             <a:extLst>
               <a:ext uri="{FF2B5EF4-FFF2-40B4-BE49-F238E27FC236}">
-                <a16:creationId xmlns:a16="http://schemas.microsoft.com/office/drawing/2014/main" id="{55E60190-8ED6-4C32-8812-4CB81CCF9153}"/>
+                <a16:creationId xmlns="" xmlns:a16="http://schemas.microsoft.com/office/drawing/2014/main" id="{55E60190-8ED6-4C32-8812-4CB81CCF9153}"/>
               </a:ext>
             </a:extLst>
           </p:cNvPr>
@@ -2369,7 +2369,7 @@
           <p:cNvPr id="5" name="Date Placeholder 4">
             <a:extLst>
               <a:ext uri="{FF2B5EF4-FFF2-40B4-BE49-F238E27FC236}">
-                <a16:creationId xmlns:a16="http://schemas.microsoft.com/office/drawing/2014/main" id="{1F94AB3B-3BC7-4276-9F78-F6A3B57404DB}"/>
+                <a16:creationId xmlns="" xmlns:a16="http://schemas.microsoft.com/office/drawing/2014/main" id="{1F94AB3B-3BC7-4276-9F78-F6A3B57404DB}"/>
               </a:ext>
             </a:extLst>
           </p:cNvPr>
@@ -2387,7 +2387,7 @@
           <a:p>
             <a:fld id="{D395B063-14E2-4061-81F5-618BC32A213E}" type="datetimeFigureOut">
               <a:rPr lang="en-US" smtClean="0"/>
-              <a:t>9/20/2020</a:t>
+              <a:t>10/28/2020</a:t>
             </a:fld>
             <a:endParaRPr lang="en-US" dirty="0"/>
           </a:p>
@@ -2398,7 +2398,7 @@
           <p:cNvPr id="6" name="Footer Placeholder 5">
             <a:extLst>
               <a:ext uri="{FF2B5EF4-FFF2-40B4-BE49-F238E27FC236}">
-                <a16:creationId xmlns:a16="http://schemas.microsoft.com/office/drawing/2014/main" id="{EEB9CC9D-0C17-4763-9C16-F956BEE84348}"/>
+                <a16:creationId xmlns="" xmlns:a16="http://schemas.microsoft.com/office/drawing/2014/main" id="{EEB9CC9D-0C17-4763-9C16-F956BEE84348}"/>
               </a:ext>
             </a:extLst>
           </p:cNvPr>
@@ -2423,7 +2423,7 @@
           <p:cNvPr id="7" name="Slide Number Placeholder 6">
             <a:extLst>
               <a:ext uri="{FF2B5EF4-FFF2-40B4-BE49-F238E27FC236}">
-                <a16:creationId xmlns:a16="http://schemas.microsoft.com/office/drawing/2014/main" id="{38E6C1E1-D1EB-4CC5-9D59-6DEAFD7D479F}"/>
+                <a16:creationId xmlns="" xmlns:a16="http://schemas.microsoft.com/office/drawing/2014/main" id="{38E6C1E1-D1EB-4CC5-9D59-6DEAFD7D479F}"/>
               </a:ext>
             </a:extLst>
           </p:cNvPr>
@@ -2482,7 +2482,7 @@
           <p:cNvPr id="2" name="Title 1">
             <a:extLst>
               <a:ext uri="{FF2B5EF4-FFF2-40B4-BE49-F238E27FC236}">
-                <a16:creationId xmlns:a16="http://schemas.microsoft.com/office/drawing/2014/main" id="{D909757E-F879-4891-8062-EEDE9210EBEF}"/>
+                <a16:creationId xmlns="" xmlns:a16="http://schemas.microsoft.com/office/drawing/2014/main" id="{D909757E-F879-4891-8062-EEDE9210EBEF}"/>
               </a:ext>
             </a:extLst>
           </p:cNvPr>
@@ -2519,7 +2519,7 @@
           <p:cNvPr id="3" name="Picture Placeholder 2">
             <a:extLst>
               <a:ext uri="{FF2B5EF4-FFF2-40B4-BE49-F238E27FC236}">
-                <a16:creationId xmlns:a16="http://schemas.microsoft.com/office/drawing/2014/main" id="{62618F09-7D7E-4646-8859-1BDD5CA9F091}"/>
+                <a16:creationId xmlns="" xmlns:a16="http://schemas.microsoft.com/office/drawing/2014/main" id="{62618F09-7D7E-4646-8859-1BDD5CA9F091}"/>
               </a:ext>
             </a:extLst>
           </p:cNvPr>
@@ -2586,7 +2586,7 @@
           <p:cNvPr id="4" name="Text Placeholder 3">
             <a:extLst>
               <a:ext uri="{FF2B5EF4-FFF2-40B4-BE49-F238E27FC236}">
-                <a16:creationId xmlns:a16="http://schemas.microsoft.com/office/drawing/2014/main" id="{1ED8FE34-6DF5-4167-A4A3-A22BEAEA2544}"/>
+                <a16:creationId xmlns="" xmlns:a16="http://schemas.microsoft.com/office/drawing/2014/main" id="{1ED8FE34-6DF5-4167-A4A3-A22BEAEA2544}"/>
               </a:ext>
             </a:extLst>
           </p:cNvPr>
@@ -2657,7 +2657,7 @@
           <p:cNvPr id="5" name="Date Placeholder 4">
             <a:extLst>
               <a:ext uri="{FF2B5EF4-FFF2-40B4-BE49-F238E27FC236}">
-                <a16:creationId xmlns:a16="http://schemas.microsoft.com/office/drawing/2014/main" id="{DBD63AD0-AB10-4BA2-B37F-091F6FCF73E3}"/>
+                <a16:creationId xmlns="" xmlns:a16="http://schemas.microsoft.com/office/drawing/2014/main" id="{DBD63AD0-AB10-4BA2-B37F-091F6FCF73E3}"/>
               </a:ext>
             </a:extLst>
           </p:cNvPr>
@@ -2675,7 +2675,7 @@
           <a:p>
             <a:fld id="{D395B063-14E2-4061-81F5-618BC32A213E}" type="datetimeFigureOut">
               <a:rPr lang="en-US" smtClean="0"/>
-              <a:t>9/20/2020</a:t>
+              <a:t>10/28/2020</a:t>
             </a:fld>
             <a:endParaRPr lang="en-US" dirty="0"/>
           </a:p>
@@ -2686,7 +2686,7 @@
           <p:cNvPr id="6" name="Footer Placeholder 5">
             <a:extLst>
               <a:ext uri="{FF2B5EF4-FFF2-40B4-BE49-F238E27FC236}">
-                <a16:creationId xmlns:a16="http://schemas.microsoft.com/office/drawing/2014/main" id="{EEF79296-DBC6-4356-9C6A-0BA2A1EB13DF}"/>
+                <a16:creationId xmlns="" xmlns:a16="http://schemas.microsoft.com/office/drawing/2014/main" id="{EEF79296-DBC6-4356-9C6A-0BA2A1EB13DF}"/>
               </a:ext>
             </a:extLst>
           </p:cNvPr>
@@ -2711,7 +2711,7 @@
           <p:cNvPr id="7" name="Slide Number Placeholder 6">
             <a:extLst>
               <a:ext uri="{FF2B5EF4-FFF2-40B4-BE49-F238E27FC236}">
-                <a16:creationId xmlns:a16="http://schemas.microsoft.com/office/drawing/2014/main" id="{39DFEB0F-92A8-4CFC-893C-6F46A0F84D72}"/>
+                <a16:creationId xmlns="" xmlns:a16="http://schemas.microsoft.com/office/drawing/2014/main" id="{39DFEB0F-92A8-4CFC-893C-6F46A0F84D72}"/>
               </a:ext>
             </a:extLst>
           </p:cNvPr>
@@ -2775,7 +2775,7 @@
           <p:cNvPr id="2" name="Title Placeholder 1">
             <a:extLst>
               <a:ext uri="{FF2B5EF4-FFF2-40B4-BE49-F238E27FC236}">
-                <a16:creationId xmlns:a16="http://schemas.microsoft.com/office/drawing/2014/main" id="{6CBA34CD-55B6-45BC-A6CC-93108EE9C70E}"/>
+                <a16:creationId xmlns="" xmlns:a16="http://schemas.microsoft.com/office/drawing/2014/main" id="{6CBA34CD-55B6-45BC-A6CC-93108EE9C70E}"/>
               </a:ext>
             </a:extLst>
           </p:cNvPr>
@@ -2813,7 +2813,7 @@
           <p:cNvPr id="3" name="Text Placeholder 2">
             <a:extLst>
               <a:ext uri="{FF2B5EF4-FFF2-40B4-BE49-F238E27FC236}">
-                <a16:creationId xmlns:a16="http://schemas.microsoft.com/office/drawing/2014/main" id="{D156E857-EBE5-42B8-826E-8F16D16C5BAF}"/>
+                <a16:creationId xmlns="" xmlns:a16="http://schemas.microsoft.com/office/drawing/2014/main" id="{D156E857-EBE5-42B8-826E-8F16D16C5BAF}"/>
               </a:ext>
             </a:extLst>
           </p:cNvPr>
@@ -2880,7 +2880,7 @@
           <p:cNvPr id="4" name="Date Placeholder 3">
             <a:extLst>
               <a:ext uri="{FF2B5EF4-FFF2-40B4-BE49-F238E27FC236}">
-                <a16:creationId xmlns:a16="http://schemas.microsoft.com/office/drawing/2014/main" id="{A0517830-A057-422E-B60B-0174A5304AC8}"/>
+                <a16:creationId xmlns="" xmlns:a16="http://schemas.microsoft.com/office/drawing/2014/main" id="{A0517830-A057-422E-B60B-0174A5304AC8}"/>
               </a:ext>
             </a:extLst>
           </p:cNvPr>
@@ -2916,7 +2916,7 @@
           <a:p>
             <a:fld id="{D395B063-14E2-4061-81F5-618BC32A213E}" type="datetimeFigureOut">
               <a:rPr lang="en-US" smtClean="0"/>
-              <a:t>9/20/2020</a:t>
+              <a:t>10/28/2020</a:t>
             </a:fld>
             <a:endParaRPr lang="en-US" dirty="0"/>
           </a:p>
@@ -2927,7 +2927,7 @@
           <p:cNvPr id="5" name="Footer Placeholder 4">
             <a:extLst>
               <a:ext uri="{FF2B5EF4-FFF2-40B4-BE49-F238E27FC236}">
-                <a16:creationId xmlns:a16="http://schemas.microsoft.com/office/drawing/2014/main" id="{28659570-1E32-4F08-A375-1562591B867D}"/>
+                <a16:creationId xmlns="" xmlns:a16="http://schemas.microsoft.com/office/drawing/2014/main" id="{28659570-1E32-4F08-A375-1562591B867D}"/>
               </a:ext>
             </a:extLst>
           </p:cNvPr>
@@ -2970,7 +2970,7 @@
           <p:cNvPr id="6" name="Slide Number Placeholder 5">
             <a:extLst>
               <a:ext uri="{FF2B5EF4-FFF2-40B4-BE49-F238E27FC236}">
-                <a16:creationId xmlns:a16="http://schemas.microsoft.com/office/drawing/2014/main" id="{68380BB8-81CC-4E3F-ADC3-011029DC3176}"/>
+                <a16:creationId xmlns="" xmlns:a16="http://schemas.microsoft.com/office/drawing/2014/main" id="{68380BB8-81CC-4E3F-ADC3-011029DC3176}"/>
               </a:ext>
             </a:extLst>
           </p:cNvPr>
@@ -3338,7 +3338,7 @@
           <p:cNvPr id="2" name="Title 1">
             <a:extLst>
               <a:ext uri="{FF2B5EF4-FFF2-40B4-BE49-F238E27FC236}">
-                <a16:creationId xmlns:a16="http://schemas.microsoft.com/office/drawing/2014/main" id="{5F1D088A-8E76-4CE1-B1A6-ABFA69762222}"/>
+                <a16:creationId xmlns="" xmlns:a16="http://schemas.microsoft.com/office/drawing/2014/main" id="{5F1D088A-8E76-4CE1-B1A6-ABFA69762222}"/>
               </a:ext>
             </a:extLst>
           </p:cNvPr>
@@ -3366,7 +3366,7 @@
           <p:cNvPr id="3" name="Content Placeholder 2">
             <a:extLst>
               <a:ext uri="{FF2B5EF4-FFF2-40B4-BE49-F238E27FC236}">
-                <a16:creationId xmlns:a16="http://schemas.microsoft.com/office/drawing/2014/main" id="{A36D42E8-7968-40C6-8C0A-192732BFCE93}"/>
+                <a16:creationId xmlns="" xmlns:a16="http://schemas.microsoft.com/office/drawing/2014/main" id="{A36D42E8-7968-40C6-8C0A-192732BFCE93}"/>
               </a:ext>
             </a:extLst>
           </p:cNvPr>
@@ -3444,7 +3444,7 @@
           <p:cNvPr id="2" name="Picture 1">
             <a:extLst>
               <a:ext uri="{FF2B5EF4-FFF2-40B4-BE49-F238E27FC236}">
-                <a16:creationId xmlns:a16="http://schemas.microsoft.com/office/drawing/2014/main" id="{FEA2E9E6-5F83-4801-806A-7FD2ADB95EBF}"/>
+                <a16:creationId xmlns="" xmlns:a16="http://schemas.microsoft.com/office/drawing/2014/main" id="{FEA2E9E6-5F83-4801-806A-7FD2ADB95EBF}"/>
               </a:ext>
             </a:extLst>
           </p:cNvPr>
@@ -3504,7 +3504,7 @@
           <p:cNvPr id="2" name="Title 1">
             <a:extLst>
               <a:ext uri="{FF2B5EF4-FFF2-40B4-BE49-F238E27FC236}">
-                <a16:creationId xmlns:a16="http://schemas.microsoft.com/office/drawing/2014/main" id="{A264B4DB-166E-48C8-A849-61BF637EE88C}"/>
+                <a16:creationId xmlns="" xmlns:a16="http://schemas.microsoft.com/office/drawing/2014/main" id="{A264B4DB-166E-48C8-A849-61BF637EE88C}"/>
               </a:ext>
             </a:extLst>
           </p:cNvPr>
@@ -3536,7 +3536,7 @@
           <p:cNvPr id="5" name="Content Placeholder 4">
             <a:extLst>
               <a:ext uri="{FF2B5EF4-FFF2-40B4-BE49-F238E27FC236}">
-                <a16:creationId xmlns:a16="http://schemas.microsoft.com/office/drawing/2014/main" id="{86CD7C51-EF85-404A-AE05-2421888464A4}"/>
+                <a16:creationId xmlns="" xmlns:a16="http://schemas.microsoft.com/office/drawing/2014/main" id="{86CD7C51-EF85-404A-AE05-2421888464A4}"/>
               </a:ext>
             </a:extLst>
           </p:cNvPr>
@@ -3568,7 +3568,7 @@
           <p:cNvPr id="4" name="Text Placeholder 3">
             <a:extLst>
               <a:ext uri="{FF2B5EF4-FFF2-40B4-BE49-F238E27FC236}">
-                <a16:creationId xmlns:a16="http://schemas.microsoft.com/office/drawing/2014/main" id="{9E03710F-01C8-4EF0-86A0-E4596465A54B}"/>
+                <a16:creationId xmlns="" xmlns:a16="http://schemas.microsoft.com/office/drawing/2014/main" id="{9E03710F-01C8-4EF0-86A0-E4596465A54B}"/>
               </a:ext>
             </a:extLst>
           </p:cNvPr>
@@ -3632,7 +3632,7 @@
           <p:cNvPr id="2" name="Title 1">
             <a:extLst>
               <a:ext uri="{FF2B5EF4-FFF2-40B4-BE49-F238E27FC236}">
-                <a16:creationId xmlns:a16="http://schemas.microsoft.com/office/drawing/2014/main" id="{9A022D57-A3BA-4426-8C81-30BFE960F8E9}"/>
+                <a16:creationId xmlns="" xmlns:a16="http://schemas.microsoft.com/office/drawing/2014/main" id="{9A022D57-A3BA-4426-8C81-30BFE960F8E9}"/>
               </a:ext>
             </a:extLst>
           </p:cNvPr>
@@ -3664,7 +3664,7 @@
           <p:cNvPr id="6" name="Picture Placeholder 5">
             <a:extLst>
               <a:ext uri="{FF2B5EF4-FFF2-40B4-BE49-F238E27FC236}">
-                <a16:creationId xmlns:a16="http://schemas.microsoft.com/office/drawing/2014/main" id="{40A897F2-DFF1-4433-A05C-49C82147D3A6}"/>
+                <a16:creationId xmlns="" xmlns:a16="http://schemas.microsoft.com/office/drawing/2014/main" id="{40A897F2-DFF1-4433-A05C-49C82147D3A6}"/>
               </a:ext>
             </a:extLst>
           </p:cNvPr>
@@ -3700,7 +3700,7 @@
           <p:cNvPr id="4" name="Text Placeholder 3">
             <a:extLst>
               <a:ext uri="{FF2B5EF4-FFF2-40B4-BE49-F238E27FC236}">
-                <a16:creationId xmlns:a16="http://schemas.microsoft.com/office/drawing/2014/main" id="{B7F2C625-9E40-445B-9DF5-81FF22B244A4}"/>
+                <a16:creationId xmlns="" xmlns:a16="http://schemas.microsoft.com/office/drawing/2014/main" id="{B7F2C625-9E40-445B-9DF5-81FF22B244A4}"/>
               </a:ext>
             </a:extLst>
           </p:cNvPr>
@@ -3766,7 +3766,7 @@
           <p:cNvPr id="2" name="Title 1">
             <a:extLst>
               <a:ext uri="{FF2B5EF4-FFF2-40B4-BE49-F238E27FC236}">
-                <a16:creationId xmlns:a16="http://schemas.microsoft.com/office/drawing/2014/main" id="{1D413E88-76B5-4D07-AF89-5D9B414F1AA5}"/>
+                <a16:creationId xmlns="" xmlns:a16="http://schemas.microsoft.com/office/drawing/2014/main" id="{1D413E88-76B5-4D07-AF89-5D9B414F1AA5}"/>
               </a:ext>
             </a:extLst>
           </p:cNvPr>
@@ -3798,7 +3798,7 @@
           <p:cNvPr id="6" name="Picture Placeholder 5">
             <a:extLst>
               <a:ext uri="{FF2B5EF4-FFF2-40B4-BE49-F238E27FC236}">
-                <a16:creationId xmlns:a16="http://schemas.microsoft.com/office/drawing/2014/main" id="{D4DB6626-E73C-48DB-AA0D-17BF5AC0F9F8}"/>
+                <a16:creationId xmlns="" xmlns:a16="http://schemas.microsoft.com/office/drawing/2014/main" id="{D4DB6626-E73C-48DB-AA0D-17BF5AC0F9F8}"/>
               </a:ext>
             </a:extLst>
           </p:cNvPr>
@@ -3834,7 +3834,7 @@
           <p:cNvPr id="4" name="Text Placeholder 3">
             <a:extLst>
               <a:ext uri="{FF2B5EF4-FFF2-40B4-BE49-F238E27FC236}">
-                <a16:creationId xmlns:a16="http://schemas.microsoft.com/office/drawing/2014/main" id="{4D4F207F-3BC2-46F1-8809-B71C7FD809B7}"/>
+                <a16:creationId xmlns="" xmlns:a16="http://schemas.microsoft.com/office/drawing/2014/main" id="{4D4F207F-3BC2-46F1-8809-B71C7FD809B7}"/>
               </a:ext>
             </a:extLst>
           </p:cNvPr>
@@ -3892,7 +3892,7 @@
           <p:cNvPr id="2" name="Title 1">
             <a:extLst>
               <a:ext uri="{FF2B5EF4-FFF2-40B4-BE49-F238E27FC236}">
-                <a16:creationId xmlns:a16="http://schemas.microsoft.com/office/drawing/2014/main" id="{4614554B-CFF0-4316-BCD3-25620AEF2970}"/>
+                <a16:creationId xmlns="" xmlns:a16="http://schemas.microsoft.com/office/drawing/2014/main" id="{4614554B-CFF0-4316-BCD3-25620AEF2970}"/>
               </a:ext>
             </a:extLst>
           </p:cNvPr>
@@ -3920,7 +3920,7 @@
           <p:cNvPr id="5" name="Content Placeholder 4">
             <a:extLst>
               <a:ext uri="{FF2B5EF4-FFF2-40B4-BE49-F238E27FC236}">
-                <a16:creationId xmlns:a16="http://schemas.microsoft.com/office/drawing/2014/main" id="{EF2F8E66-E5C1-42D1-81B6-2DC83477AA41}"/>
+                <a16:creationId xmlns="" xmlns:a16="http://schemas.microsoft.com/office/drawing/2014/main" id="{EF2F8E66-E5C1-42D1-81B6-2DC83477AA41}"/>
               </a:ext>
             </a:extLst>
           </p:cNvPr>
@@ -3952,7 +3952,7 @@
           <p:cNvPr id="4" name="Text Placeholder 3">
             <a:extLst>
               <a:ext uri="{FF2B5EF4-FFF2-40B4-BE49-F238E27FC236}">
-                <a16:creationId xmlns:a16="http://schemas.microsoft.com/office/drawing/2014/main" id="{C66CE003-53C2-4B3C-850A-86C88B07677F}"/>
+                <a16:creationId xmlns="" xmlns:a16="http://schemas.microsoft.com/office/drawing/2014/main" id="{C66CE003-53C2-4B3C-850A-86C88B07677F}"/>
               </a:ext>
             </a:extLst>
           </p:cNvPr>
@@ -4018,7 +4018,7 @@
           <p:cNvPr id="2" name="Title 1">
             <a:extLst>
               <a:ext uri="{FF2B5EF4-FFF2-40B4-BE49-F238E27FC236}">
-                <a16:creationId xmlns:a16="http://schemas.microsoft.com/office/drawing/2014/main" id="{E10B806B-6919-4822-A567-1F39B4C8FEBD}"/>
+                <a16:creationId xmlns="" xmlns:a16="http://schemas.microsoft.com/office/drawing/2014/main" id="{E10B806B-6919-4822-A567-1F39B4C8FEBD}"/>
               </a:ext>
             </a:extLst>
           </p:cNvPr>
@@ -4046,7 +4046,7 @@
           <p:cNvPr id="6" name="Picture Placeholder 5">
             <a:extLst>
               <a:ext uri="{FF2B5EF4-FFF2-40B4-BE49-F238E27FC236}">
-                <a16:creationId xmlns:a16="http://schemas.microsoft.com/office/drawing/2014/main" id="{2EC83AEF-F18D-4D78-9EF4-230DE15B0513}"/>
+                <a16:creationId xmlns="" xmlns:a16="http://schemas.microsoft.com/office/drawing/2014/main" id="{2EC83AEF-F18D-4D78-9EF4-230DE15B0513}"/>
               </a:ext>
             </a:extLst>
           </p:cNvPr>
@@ -4082,7 +4082,7 @@
           <p:cNvPr id="4" name="Text Placeholder 3">
             <a:extLst>
               <a:ext uri="{FF2B5EF4-FFF2-40B4-BE49-F238E27FC236}">
-                <a16:creationId xmlns:a16="http://schemas.microsoft.com/office/drawing/2014/main" id="{F4C81263-1AEB-4A13-B149-6A80808184F0}"/>
+                <a16:creationId xmlns="" xmlns:a16="http://schemas.microsoft.com/office/drawing/2014/main" id="{F4C81263-1AEB-4A13-B149-6A80808184F0}"/>
               </a:ext>
             </a:extLst>
           </p:cNvPr>
@@ -4140,7 +4140,7 @@
           <p:cNvPr id="2" name="Picture 1">
             <a:extLst>
               <a:ext uri="{FF2B5EF4-FFF2-40B4-BE49-F238E27FC236}">
-                <a16:creationId xmlns:a16="http://schemas.microsoft.com/office/drawing/2014/main" id="{54CF5EE0-EDD8-43A2-BFA9-D72B607CD468}"/>
+                <a16:creationId xmlns="" xmlns:a16="http://schemas.microsoft.com/office/drawing/2014/main" id="{54CF5EE0-EDD8-43A2-BFA9-D72B607CD468}"/>
               </a:ext>
             </a:extLst>
           </p:cNvPr>
@@ -4467,7 +4467,7 @@
   <a:extraClrSchemeLst/>
   <a:extLst>
     <a:ext uri="{05A4C25C-085E-4340-85A3-A5531E510DB2}">
-      <thm15:themeFamily xmlns:thm15="http://schemas.microsoft.com/office/thememl/2012/main" name="Office Theme" id="{62F939B6-93AF-4DB8-9C6B-D6C7DFDC589F}" vid="{4A3C46E8-61CC-4603-A589-7422A47A8E4A}"/>
+      <thm15:themeFamily xmlns="" xmlns:thm15="http://schemas.microsoft.com/office/thememl/2012/main" name="Office Theme" id="{62F939B6-93AF-4DB8-9C6B-D6C7DFDC589F}" vid="{4A3C46E8-61CC-4603-A589-7422A47A8E4A}"/>
     </a:ext>
   </a:extLst>
 </a:theme>

</xml_diff>